<commit_message>
post section 2 video 2
</commit_message>
<xml_diff>
--- a/Sections/Section 2/Entity Fundamentals Using .NET 6_Section 2.pptx
+++ b/Sections/Section 2/Entity Fundamentals Using .NET 6_Section 2.pptx
@@ -4643,7 +4643,7 @@
           <a:p>
             <a:fld id="{39C05CB7-7154-42F2-8D93-1E20B1508952}" type="datetimeFigureOut">
               <a:rPr lang="en-US" smtClean="0"/>
-              <a:t>3/23/2022</a:t>
+              <a:t>3/24/2022</a:t>
             </a:fld>
             <a:endParaRPr lang="en-US"/>
           </a:p>
@@ -4808,7 +4808,7 @@
           <a:p>
             <a:fld id="{8E1E840F-9B2B-44B5-896B-5B857B514EB5}" type="datetimeFigureOut">
               <a:rPr lang="en-US" smtClean="0"/>
-              <a:t>3/23/2022</a:t>
+              <a:t>3/24/2022</a:t>
             </a:fld>
             <a:endParaRPr lang="en-US"/>
           </a:p>
@@ -20770,8 +20770,21 @@
                   <a:schemeClr val="bg1"/>
                 </a:solidFill>
               </a:rPr>
-              <a:t> PK column in Db)</a:t>
+              <a:t> PK column in Db, default</a:t>
             </a:r>
+            <a:r>
+              <a:rPr lang="en-US" sz="1600">
+                <a:solidFill>
+                  <a:schemeClr val="bg1"/>
+                </a:solidFill>
+              </a:rPr>
+              <a:t>: Identity)</a:t>
+            </a:r>
+            <a:endParaRPr lang="en-US" sz="1600" dirty="0">
+              <a:solidFill>
+                <a:schemeClr val="bg1"/>
+              </a:solidFill>
+            </a:endParaRPr>
           </a:p>
           <a:p>
             <a:pPr marL="171450" indent="-171450">

</xml_diff>